<commit_message>
Wrote the script for Topic 9
</commit_message>
<xml_diff>
--- a/Topic 9 - AE1.pptx
+++ b/Topic 9 - AE1.pptx
@@ -112,6 +112,11 @@
       </a:defRPr>
     </a:lvl9pPr>
   </p:defaultTextStyle>
+  <p:extLst>
+    <p:ext uri="{EFAFB233-063F-42B5-8137-9DF3F51BA10A}">
+      <p15:sldGuideLst xmlns:p15="http://schemas.microsoft.com/office/powerpoint/2012/main"/>
+    </p:ext>
+  </p:extLst>
 </p:presentation>
 </file>
 
@@ -830,7 +835,7 @@
           <a:noFill/>
           <a:extLst>
             <a:ext uri="{909E8E84-426E-40dd-AFC4-6F175D3DCCD1}">
-              <a14:hiddenFill xmlns:a14="http://schemas.microsoft.com/office/drawing/2010/main" xmlns="">
+              <a14:hiddenFill xmlns="" xmlns:a14="http://schemas.microsoft.com/office/drawing/2010/main">
                 <a:solidFill>
                   <a:srgbClr val="FFFFFF"/>
                 </a:solidFill>
@@ -890,7 +895,7 @@
             </a:ln>
             <a:extLst>
               <a:ext uri="{91240B29-F687-4f45-9708-019B960494DF}">
-                <a14:hiddenLine xmlns:a14="http://schemas.microsoft.com/office/drawing/2010/main" xmlns="" w="9525">
+                <a14:hiddenLine xmlns="" xmlns:a14="http://schemas.microsoft.com/office/drawing/2010/main" w="9525">
                   <a:solidFill>
                     <a:srgbClr val="000000"/>
                   </a:solidFill>
@@ -980,7 +985,7 @@
             </a:ln>
             <a:extLst>
               <a:ext uri="{91240B29-F687-4f45-9708-019B960494DF}">
-                <a14:hiddenLine xmlns:a14="http://schemas.microsoft.com/office/drawing/2010/main" xmlns="" w="9525">
+                <a14:hiddenLine xmlns="" xmlns:a14="http://schemas.microsoft.com/office/drawing/2010/main" w="9525">
                   <a:solidFill>
                     <a:srgbClr val="000000"/>
                   </a:solidFill>
@@ -1070,7 +1075,7 @@
             </a:ln>
             <a:extLst>
               <a:ext uri="{91240B29-F687-4f45-9708-019B960494DF}">
-                <a14:hiddenLine xmlns:a14="http://schemas.microsoft.com/office/drawing/2010/main" xmlns="" w="9525">
+                <a14:hiddenLine xmlns="" xmlns:a14="http://schemas.microsoft.com/office/drawing/2010/main" w="9525">
                   <a:solidFill>
                     <a:srgbClr val="000000"/>
                   </a:solidFill>
@@ -1104,7 +1109,7 @@
             </a:ln>
             <a:extLst>
               <a:ext uri="{91240B29-F687-4f45-9708-019B960494DF}">
-                <a14:hiddenLine xmlns:a14="http://schemas.microsoft.com/office/drawing/2010/main" xmlns="" w="9525">
+                <a14:hiddenLine xmlns="" xmlns:a14="http://schemas.microsoft.com/office/drawing/2010/main" w="9525">
                   <a:solidFill>
                     <a:srgbClr val="000000"/>
                   </a:solidFill>
@@ -1194,7 +1199,7 @@
             </a:ln>
             <a:extLst>
               <a:ext uri="{91240B29-F687-4f45-9708-019B960494DF}">
-                <a14:hiddenLine xmlns:a14="http://schemas.microsoft.com/office/drawing/2010/main" xmlns="" w="9525">
+                <a14:hiddenLine xmlns="" xmlns:a14="http://schemas.microsoft.com/office/drawing/2010/main" w="9525">
                   <a:solidFill>
                     <a:srgbClr val="000000"/>
                   </a:solidFill>
@@ -1256,7 +1261,7 @@
             </a:ln>
             <a:extLst>
               <a:ext uri="{91240B29-F687-4f45-9708-019B960494DF}">
-                <a14:hiddenLine xmlns:a14="http://schemas.microsoft.com/office/drawing/2010/main" xmlns="" w="9525">
+                <a14:hiddenLine xmlns="" xmlns:a14="http://schemas.microsoft.com/office/drawing/2010/main" w="9525">
                   <a:solidFill>
                     <a:srgbClr val="000000"/>
                   </a:solidFill>
@@ -1318,7 +1323,7 @@
             </a:ln>
             <a:extLst>
               <a:ext uri="{91240B29-F687-4f45-9708-019B960494DF}">
-                <a14:hiddenLine xmlns:a14="http://schemas.microsoft.com/office/drawing/2010/main" xmlns="" w="9525">
+                <a14:hiddenLine xmlns="" xmlns:a14="http://schemas.microsoft.com/office/drawing/2010/main" w="9525">
                   <a:solidFill>
                     <a:srgbClr val="000000"/>
                   </a:solidFill>
@@ -1408,7 +1413,7 @@
             </a:ln>
             <a:extLst>
               <a:ext uri="{91240B29-F687-4f45-9708-019B960494DF}">
-                <a14:hiddenLine xmlns:a14="http://schemas.microsoft.com/office/drawing/2010/main" xmlns="" w="9525">
+                <a14:hiddenLine xmlns="" xmlns:a14="http://schemas.microsoft.com/office/drawing/2010/main" w="9525">
                   <a:solidFill>
                     <a:srgbClr val="000000"/>
                   </a:solidFill>
@@ -1470,7 +1475,7 @@
             </a:ln>
             <a:extLst>
               <a:ext uri="{91240B29-F687-4f45-9708-019B960494DF}">
-                <a14:hiddenLine xmlns:a14="http://schemas.microsoft.com/office/drawing/2010/main" xmlns="" w="9525">
+                <a14:hiddenLine xmlns="" xmlns:a14="http://schemas.microsoft.com/office/drawing/2010/main" w="9525">
                   <a:solidFill>
                     <a:srgbClr val="000000"/>
                   </a:solidFill>
@@ -1532,7 +1537,7 @@
             </a:ln>
             <a:extLst>
               <a:ext uri="{91240B29-F687-4f45-9708-019B960494DF}">
-                <a14:hiddenLine xmlns:a14="http://schemas.microsoft.com/office/drawing/2010/main" xmlns="" w="9525">
+                <a14:hiddenLine xmlns="" xmlns:a14="http://schemas.microsoft.com/office/drawing/2010/main" w="9525">
                   <a:solidFill>
                     <a:srgbClr val="000000"/>
                   </a:solidFill>
@@ -1622,7 +1627,7 @@
             </a:ln>
             <a:extLst>
               <a:ext uri="{91240B29-F687-4f45-9708-019B960494DF}">
-                <a14:hiddenLine xmlns:a14="http://schemas.microsoft.com/office/drawing/2010/main" xmlns="" w="9525">
+                <a14:hiddenLine xmlns="" xmlns:a14="http://schemas.microsoft.com/office/drawing/2010/main" w="9525">
                   <a:solidFill>
                     <a:srgbClr val="000000"/>
                   </a:solidFill>
@@ -1712,7 +1717,7 @@
             </a:ln>
             <a:extLst>
               <a:ext uri="{91240B29-F687-4f45-9708-019B960494DF}">
-                <a14:hiddenLine xmlns:a14="http://schemas.microsoft.com/office/drawing/2010/main" xmlns="" w="9525">
+                <a14:hiddenLine xmlns="" xmlns:a14="http://schemas.microsoft.com/office/drawing/2010/main" w="9525">
                   <a:solidFill>
                     <a:srgbClr val="000000"/>
                   </a:solidFill>
@@ -1774,7 +1779,7 @@
             </a:ln>
             <a:extLst>
               <a:ext uri="{91240B29-F687-4f45-9708-019B960494DF}">
-                <a14:hiddenLine xmlns:a14="http://schemas.microsoft.com/office/drawing/2010/main" xmlns="" w="9525">
+                <a14:hiddenLine xmlns="" xmlns:a14="http://schemas.microsoft.com/office/drawing/2010/main" w="9525">
                   <a:solidFill>
                     <a:srgbClr val="000000"/>
                   </a:solidFill>
@@ -1884,7 +1889,7 @@
             </a:ln>
             <a:extLst>
               <a:ext uri="{91240B29-F687-4f45-9708-019B960494DF}">
-                <a14:hiddenLine xmlns:a14="http://schemas.microsoft.com/office/drawing/2010/main" xmlns="" w="9525">
+                <a14:hiddenLine xmlns="" xmlns:a14="http://schemas.microsoft.com/office/drawing/2010/main" w="9525">
                   <a:solidFill>
                     <a:srgbClr val="000000"/>
                   </a:solidFill>
@@ -1946,7 +1951,7 @@
             </a:ln>
             <a:extLst>
               <a:ext uri="{91240B29-F687-4f45-9708-019B960494DF}">
-                <a14:hiddenLine xmlns:a14="http://schemas.microsoft.com/office/drawing/2010/main" xmlns="" w="9525">
+                <a14:hiddenLine xmlns="" xmlns:a14="http://schemas.microsoft.com/office/drawing/2010/main" w="9525">
                   <a:solidFill>
                     <a:srgbClr val="000000"/>
                   </a:solidFill>
@@ -2036,7 +2041,7 @@
             </a:ln>
             <a:extLst>
               <a:ext uri="{91240B29-F687-4f45-9708-019B960494DF}">
-                <a14:hiddenLine xmlns:a14="http://schemas.microsoft.com/office/drawing/2010/main" xmlns="" w="9525">
+                <a14:hiddenLine xmlns="" xmlns:a14="http://schemas.microsoft.com/office/drawing/2010/main" w="9525">
                   <a:solidFill>
                     <a:srgbClr val="000000"/>
                   </a:solidFill>
@@ -2126,7 +2131,7 @@
             </a:ln>
             <a:extLst>
               <a:ext uri="{91240B29-F687-4f45-9708-019B960494DF}">
-                <a14:hiddenLine xmlns:a14="http://schemas.microsoft.com/office/drawing/2010/main" xmlns="" w="9525">
+                <a14:hiddenLine xmlns="" xmlns:a14="http://schemas.microsoft.com/office/drawing/2010/main" w="9525">
                   <a:solidFill>
                     <a:srgbClr val="000000"/>
                   </a:solidFill>
@@ -2188,7 +2193,7 @@
             </a:ln>
             <a:extLst>
               <a:ext uri="{91240B29-F687-4f45-9708-019B960494DF}">
-                <a14:hiddenLine xmlns:a14="http://schemas.microsoft.com/office/drawing/2010/main" xmlns="" w="9525">
+                <a14:hiddenLine xmlns="" xmlns:a14="http://schemas.microsoft.com/office/drawing/2010/main" w="9525">
                   <a:solidFill>
                     <a:srgbClr val="000000"/>
                   </a:solidFill>
@@ -2278,7 +2283,7 @@
             </a:ln>
             <a:extLst>
               <a:ext uri="{91240B29-F687-4f45-9708-019B960494DF}">
-                <a14:hiddenLine xmlns:a14="http://schemas.microsoft.com/office/drawing/2010/main" xmlns="" w="9525">
+                <a14:hiddenLine xmlns="" xmlns:a14="http://schemas.microsoft.com/office/drawing/2010/main" w="9525">
                   <a:solidFill>
                     <a:srgbClr val="000000"/>
                   </a:solidFill>
@@ -2368,7 +2373,7 @@
             </a:ln>
             <a:extLst>
               <a:ext uri="{91240B29-F687-4f45-9708-019B960494DF}">
-                <a14:hiddenLine xmlns:a14="http://schemas.microsoft.com/office/drawing/2010/main" xmlns="" w="9525">
+                <a14:hiddenLine xmlns="" xmlns:a14="http://schemas.microsoft.com/office/drawing/2010/main" w="9525">
                   <a:solidFill>
                     <a:srgbClr val="000000"/>
                   </a:solidFill>
@@ -2424,7 +2429,7 @@
             </a:ln>
             <a:extLst>
               <a:ext uri="{91240B29-F687-4f45-9708-019B960494DF}">
-                <a14:hiddenLine xmlns:a14="http://schemas.microsoft.com/office/drawing/2010/main" xmlns="" w="9525">
+                <a14:hiddenLine xmlns="" xmlns:a14="http://schemas.microsoft.com/office/drawing/2010/main" w="9525">
                   <a:solidFill>
                     <a:srgbClr val="000000"/>
                   </a:solidFill>
@@ -2514,7 +2519,7 @@
             </a:ln>
             <a:extLst>
               <a:ext uri="{91240B29-F687-4f45-9708-019B960494DF}">
-                <a14:hiddenLine xmlns:a14="http://schemas.microsoft.com/office/drawing/2010/main" xmlns="" w="9525">
+                <a14:hiddenLine xmlns="" xmlns:a14="http://schemas.microsoft.com/office/drawing/2010/main" w="9525">
                   <a:solidFill>
                     <a:srgbClr val="000000"/>
                   </a:solidFill>
@@ -2570,7 +2575,7 @@
             </a:ln>
             <a:extLst>
               <a:ext uri="{91240B29-F687-4f45-9708-019B960494DF}">
-                <a14:hiddenLine xmlns:a14="http://schemas.microsoft.com/office/drawing/2010/main" xmlns="" w="9525">
+                <a14:hiddenLine xmlns="" xmlns:a14="http://schemas.microsoft.com/office/drawing/2010/main" w="9525">
                   <a:solidFill>
                     <a:srgbClr val="000000"/>
                   </a:solidFill>
@@ -2660,7 +2665,7 @@
             </a:ln>
             <a:extLst>
               <a:ext uri="{91240B29-F687-4f45-9708-019B960494DF}">
-                <a14:hiddenLine xmlns:a14="http://schemas.microsoft.com/office/drawing/2010/main" xmlns="" w="9525">
+                <a14:hiddenLine xmlns="" xmlns:a14="http://schemas.microsoft.com/office/drawing/2010/main" w="9525">
                   <a:solidFill>
                     <a:srgbClr val="000000"/>
                   </a:solidFill>
@@ -2728,7 +2733,7 @@
             </a:ln>
             <a:extLst>
               <a:ext uri="{91240B29-F687-4f45-9708-019B960494DF}">
-                <a14:hiddenLine xmlns:a14="http://schemas.microsoft.com/office/drawing/2010/main" xmlns="" w="9525">
+                <a14:hiddenLine xmlns="" xmlns:a14="http://schemas.microsoft.com/office/drawing/2010/main" w="9525">
                   <a:solidFill>
                     <a:srgbClr val="000000"/>
                   </a:solidFill>
@@ -2818,7 +2823,7 @@
             </a:ln>
             <a:extLst>
               <a:ext uri="{91240B29-F687-4f45-9708-019B960494DF}">
-                <a14:hiddenLine xmlns:a14="http://schemas.microsoft.com/office/drawing/2010/main" xmlns="" w="9525">
+                <a14:hiddenLine xmlns="" xmlns:a14="http://schemas.microsoft.com/office/drawing/2010/main" w="9525">
                   <a:solidFill>
                     <a:srgbClr val="000000"/>
                   </a:solidFill>
@@ -2886,7 +2891,7 @@
             </a:ln>
             <a:extLst>
               <a:ext uri="{91240B29-F687-4f45-9708-019B960494DF}">
-                <a14:hiddenLine xmlns:a14="http://schemas.microsoft.com/office/drawing/2010/main" xmlns="" w="9525">
+                <a14:hiddenLine xmlns="" xmlns:a14="http://schemas.microsoft.com/office/drawing/2010/main" w="9525">
                   <a:solidFill>
                     <a:srgbClr val="000000"/>
                   </a:solidFill>
@@ -2976,7 +2981,7 @@
             </a:ln>
             <a:extLst>
               <a:ext uri="{91240B29-F687-4f45-9708-019B960494DF}">
-                <a14:hiddenLine xmlns:a14="http://schemas.microsoft.com/office/drawing/2010/main" xmlns="" w="9525">
+                <a14:hiddenLine xmlns="" xmlns:a14="http://schemas.microsoft.com/office/drawing/2010/main" w="9525">
                   <a:solidFill>
                     <a:srgbClr val="000000"/>
                   </a:solidFill>
@@ -3010,7 +3015,7 @@
             </a:ln>
             <a:extLst>
               <a:ext uri="{91240B29-F687-4f45-9708-019B960494DF}">
-                <a14:hiddenLine xmlns:a14="http://schemas.microsoft.com/office/drawing/2010/main" xmlns="" w="9525">
+                <a14:hiddenLine xmlns="" xmlns:a14="http://schemas.microsoft.com/office/drawing/2010/main" w="9525">
                   <a:solidFill>
                     <a:srgbClr val="000000"/>
                   </a:solidFill>
@@ -3100,7 +3105,7 @@
             </a:ln>
             <a:extLst>
               <a:ext uri="{91240B29-F687-4f45-9708-019B960494DF}">
-                <a14:hiddenLine xmlns:a14="http://schemas.microsoft.com/office/drawing/2010/main" xmlns="" w="9525">
+                <a14:hiddenLine xmlns="" xmlns:a14="http://schemas.microsoft.com/office/drawing/2010/main" w="9525">
                   <a:solidFill>
                     <a:srgbClr val="000000"/>
                   </a:solidFill>
@@ -3162,7 +3167,7 @@
             </a:ln>
             <a:extLst>
               <a:ext uri="{91240B29-F687-4f45-9708-019B960494DF}">
-                <a14:hiddenLine xmlns:a14="http://schemas.microsoft.com/office/drawing/2010/main" xmlns="" w="9525">
+                <a14:hiddenLine xmlns="" xmlns:a14="http://schemas.microsoft.com/office/drawing/2010/main" w="9525">
                   <a:solidFill>
                     <a:srgbClr val="000000"/>
                   </a:solidFill>
@@ -3224,7 +3229,7 @@
             </a:ln>
             <a:extLst>
               <a:ext uri="{91240B29-F687-4f45-9708-019B960494DF}">
-                <a14:hiddenLine xmlns:a14="http://schemas.microsoft.com/office/drawing/2010/main" xmlns="" w="9525">
+                <a14:hiddenLine xmlns="" xmlns:a14="http://schemas.microsoft.com/office/drawing/2010/main" w="9525">
                   <a:solidFill>
                     <a:srgbClr val="000000"/>
                   </a:solidFill>
@@ -3314,7 +3319,7 @@
             </a:ln>
             <a:extLst>
               <a:ext uri="{91240B29-F687-4f45-9708-019B960494DF}">
-                <a14:hiddenLine xmlns:a14="http://schemas.microsoft.com/office/drawing/2010/main" xmlns="" w="9525">
+                <a14:hiddenLine xmlns="" xmlns:a14="http://schemas.microsoft.com/office/drawing/2010/main" w="9525">
                   <a:solidFill>
                     <a:srgbClr val="000000"/>
                   </a:solidFill>
@@ -3382,7 +3387,7 @@
             </a:ln>
             <a:extLst>
               <a:ext uri="{91240B29-F687-4f45-9708-019B960494DF}">
-                <a14:hiddenLine xmlns:a14="http://schemas.microsoft.com/office/drawing/2010/main" xmlns="" w="9525">
+                <a14:hiddenLine xmlns="" xmlns:a14="http://schemas.microsoft.com/office/drawing/2010/main" w="9525">
                   <a:solidFill>
                     <a:srgbClr val="000000"/>
                   </a:solidFill>
@@ -3444,7 +3449,7 @@
             </a:ln>
             <a:extLst>
               <a:ext uri="{91240B29-F687-4f45-9708-019B960494DF}">
-                <a14:hiddenLine xmlns:a14="http://schemas.microsoft.com/office/drawing/2010/main" xmlns="" w="9525">
+                <a14:hiddenLine xmlns="" xmlns:a14="http://schemas.microsoft.com/office/drawing/2010/main" w="9525">
                   <a:solidFill>
                     <a:srgbClr val="000000"/>
                   </a:solidFill>
@@ -3534,7 +3539,7 @@
             </a:ln>
             <a:extLst>
               <a:ext uri="{91240B29-F687-4f45-9708-019B960494DF}">
-                <a14:hiddenLine xmlns:a14="http://schemas.microsoft.com/office/drawing/2010/main" xmlns="" w="9525">
+                <a14:hiddenLine xmlns="" xmlns:a14="http://schemas.microsoft.com/office/drawing/2010/main" w="9525">
                   <a:solidFill>
                     <a:srgbClr val="000000"/>
                   </a:solidFill>
@@ -3596,7 +3601,7 @@
             </a:ln>
             <a:extLst>
               <a:ext uri="{91240B29-F687-4f45-9708-019B960494DF}">
-                <a14:hiddenLine xmlns:a14="http://schemas.microsoft.com/office/drawing/2010/main" xmlns="" w="9525">
+                <a14:hiddenLine xmlns="" xmlns:a14="http://schemas.microsoft.com/office/drawing/2010/main" w="9525">
                   <a:solidFill>
                     <a:srgbClr val="000000"/>
                   </a:solidFill>
@@ -3686,7 +3691,7 @@
             </a:ln>
             <a:extLst>
               <a:ext uri="{91240B29-F687-4f45-9708-019B960494DF}">
-                <a14:hiddenLine xmlns:a14="http://schemas.microsoft.com/office/drawing/2010/main" xmlns="" w="9525">
+                <a14:hiddenLine xmlns="" xmlns:a14="http://schemas.microsoft.com/office/drawing/2010/main" w="9525">
                   <a:solidFill>
                     <a:srgbClr val="000000"/>
                   </a:solidFill>
@@ -3748,7 +3753,7 @@
             </a:ln>
             <a:extLst>
               <a:ext uri="{91240B29-F687-4f45-9708-019B960494DF}">
-                <a14:hiddenLine xmlns:a14="http://schemas.microsoft.com/office/drawing/2010/main" xmlns="" w="9525">
+                <a14:hiddenLine xmlns="" xmlns:a14="http://schemas.microsoft.com/office/drawing/2010/main" w="9525">
                   <a:solidFill>
                     <a:srgbClr val="000000"/>
                   </a:solidFill>
@@ -3838,7 +3843,7 @@
             </a:ln>
             <a:extLst>
               <a:ext uri="{91240B29-F687-4f45-9708-019B960494DF}">
-                <a14:hiddenLine xmlns:a14="http://schemas.microsoft.com/office/drawing/2010/main" xmlns="" w="9525">
+                <a14:hiddenLine xmlns="" xmlns:a14="http://schemas.microsoft.com/office/drawing/2010/main" w="9525">
                   <a:solidFill>
                     <a:srgbClr val="000000"/>
                   </a:solidFill>
@@ -3872,7 +3877,7 @@
             </a:ln>
             <a:extLst>
               <a:ext uri="{91240B29-F687-4f45-9708-019B960494DF}">
-                <a14:hiddenLine xmlns:a14="http://schemas.microsoft.com/office/drawing/2010/main" xmlns="" w="9525">
+                <a14:hiddenLine xmlns="" xmlns:a14="http://schemas.microsoft.com/office/drawing/2010/main" w="9525">
                   <a:solidFill>
                     <a:srgbClr val="000000"/>
                   </a:solidFill>
@@ -3937,7 +3942,7 @@
             </a:ln>
             <a:extLst>
               <a:ext uri="{91240B29-F687-4f45-9708-019B960494DF}">
-                <a14:hiddenLine xmlns:a14="http://schemas.microsoft.com/office/drawing/2010/main" xmlns="" w="9525">
+                <a14:hiddenLine xmlns="" xmlns:a14="http://schemas.microsoft.com/office/drawing/2010/main" w="9525">
                   <a:solidFill>
                     <a:srgbClr val="000000"/>
                   </a:solidFill>
@@ -4027,7 +4032,7 @@
             </a:ln>
             <a:extLst>
               <a:ext uri="{91240B29-F687-4f45-9708-019B960494DF}">
-                <a14:hiddenLine xmlns:a14="http://schemas.microsoft.com/office/drawing/2010/main" xmlns="" w="9525">
+                <a14:hiddenLine xmlns="" xmlns:a14="http://schemas.microsoft.com/office/drawing/2010/main" w="9525">
                   <a:solidFill>
                     <a:srgbClr val="000000"/>
                   </a:solidFill>
@@ -4089,7 +4094,7 @@
             </a:ln>
             <a:extLst>
               <a:ext uri="{91240B29-F687-4f45-9708-019B960494DF}">
-                <a14:hiddenLine xmlns:a14="http://schemas.microsoft.com/office/drawing/2010/main" xmlns="" w="9525">
+                <a14:hiddenLine xmlns="" xmlns:a14="http://schemas.microsoft.com/office/drawing/2010/main" w="9525">
                   <a:solidFill>
                     <a:srgbClr val="000000"/>
                   </a:solidFill>
@@ -4179,7 +4184,7 @@
             </a:ln>
             <a:extLst>
               <a:ext uri="{91240B29-F687-4f45-9708-019B960494DF}">
-                <a14:hiddenLine xmlns:a14="http://schemas.microsoft.com/office/drawing/2010/main" xmlns="" w="9525">
+                <a14:hiddenLine xmlns="" xmlns:a14="http://schemas.microsoft.com/office/drawing/2010/main" w="9525">
                   <a:solidFill>
                     <a:srgbClr val="000000"/>
                   </a:solidFill>
@@ -4269,7 +4274,7 @@
             </a:ln>
             <a:extLst>
               <a:ext uri="{91240B29-F687-4f45-9708-019B960494DF}">
-                <a14:hiddenLine xmlns:a14="http://schemas.microsoft.com/office/drawing/2010/main" xmlns="" w="9525">
+                <a14:hiddenLine xmlns="" xmlns:a14="http://schemas.microsoft.com/office/drawing/2010/main" w="9525">
                   <a:solidFill>
                     <a:srgbClr val="000000"/>
                   </a:solidFill>
@@ -4334,7 +4339,7 @@
             </a:ln>
             <a:extLst>
               <a:ext uri="{91240B29-F687-4f45-9708-019B960494DF}">
-                <a14:hiddenLine xmlns:a14="http://schemas.microsoft.com/office/drawing/2010/main" xmlns="" w="9525">
+                <a14:hiddenLine xmlns="" xmlns:a14="http://schemas.microsoft.com/office/drawing/2010/main" w="9525">
                   <a:solidFill>
                     <a:srgbClr val="000000"/>
                   </a:solidFill>
@@ -4396,7 +4401,7 @@
             </a:ln>
             <a:extLst>
               <a:ext uri="{91240B29-F687-4f45-9708-019B960494DF}">
-                <a14:hiddenLine xmlns:a14="http://schemas.microsoft.com/office/drawing/2010/main" xmlns="" w="9525">
+                <a14:hiddenLine xmlns="" xmlns:a14="http://schemas.microsoft.com/office/drawing/2010/main" w="9525">
                   <a:solidFill>
                     <a:srgbClr val="000000"/>
                   </a:solidFill>
@@ -4486,7 +4491,7 @@
             </a:ln>
             <a:extLst>
               <a:ext uri="{91240B29-F687-4f45-9708-019B960494DF}">
-                <a14:hiddenLine xmlns:a14="http://schemas.microsoft.com/office/drawing/2010/main" xmlns="" w="9525">
+                <a14:hiddenLine xmlns="" xmlns:a14="http://schemas.microsoft.com/office/drawing/2010/main" w="9525">
                   <a:solidFill>
                     <a:srgbClr val="000000"/>
                   </a:solidFill>
@@ -4576,7 +4581,7 @@
             </a:ln>
             <a:extLst>
               <a:ext uri="{91240B29-F687-4f45-9708-019B960494DF}">
-                <a14:hiddenLine xmlns:a14="http://schemas.microsoft.com/office/drawing/2010/main" xmlns="" w="9525">
+                <a14:hiddenLine xmlns="" xmlns:a14="http://schemas.microsoft.com/office/drawing/2010/main" w="9525">
                   <a:solidFill>
                     <a:srgbClr val="000000"/>
                   </a:solidFill>
@@ -4638,7 +4643,7 @@
             </a:ln>
             <a:extLst>
               <a:ext uri="{91240B29-F687-4f45-9708-019B960494DF}">
-                <a14:hiddenLine xmlns:a14="http://schemas.microsoft.com/office/drawing/2010/main" xmlns="" w="9525">
+                <a14:hiddenLine xmlns="" xmlns:a14="http://schemas.microsoft.com/office/drawing/2010/main" w="9525">
                   <a:solidFill>
                     <a:srgbClr val="000000"/>
                   </a:solidFill>
@@ -4758,7 +4763,7 @@
             </a:ln>
             <a:extLst>
               <a:ext uri="{91240B29-F687-4f45-9708-019B960494DF}">
-                <a14:hiddenLine xmlns:a14="http://schemas.microsoft.com/office/drawing/2010/main" xmlns="" w="9525">
+                <a14:hiddenLine xmlns="" xmlns:a14="http://schemas.microsoft.com/office/drawing/2010/main" w="9525">
                   <a:solidFill>
                     <a:srgbClr val="000000"/>
                   </a:solidFill>
@@ -4826,7 +4831,7 @@
             </a:ln>
             <a:extLst>
               <a:ext uri="{91240B29-F687-4f45-9708-019B960494DF}">
-                <a14:hiddenLine xmlns:a14="http://schemas.microsoft.com/office/drawing/2010/main" xmlns="" w="9525">
+                <a14:hiddenLine xmlns="" xmlns:a14="http://schemas.microsoft.com/office/drawing/2010/main" w="9525">
                   <a:solidFill>
                     <a:srgbClr val="000000"/>
                   </a:solidFill>
@@ -4916,7 +4921,7 @@
             </a:ln>
             <a:extLst>
               <a:ext uri="{91240B29-F687-4f45-9708-019B960494DF}">
-                <a14:hiddenLine xmlns:a14="http://schemas.microsoft.com/office/drawing/2010/main" xmlns="" w="9525">
+                <a14:hiddenLine xmlns="" xmlns:a14="http://schemas.microsoft.com/office/drawing/2010/main" w="9525">
                   <a:solidFill>
                     <a:srgbClr val="000000"/>
                   </a:solidFill>
@@ -9730,7 +9735,7 @@
           <a:noFill/>
           <a:extLst>
             <a:ext uri="{909E8E84-426E-40dd-AFC4-6F175D3DCCD1}">
-              <a14:hiddenFill xmlns:a14="http://schemas.microsoft.com/office/drawing/2010/main" xmlns="">
+              <a14:hiddenFill xmlns="" xmlns:a14="http://schemas.microsoft.com/office/drawing/2010/main">
                 <a:solidFill>
                   <a:srgbClr val="FFFFFF"/>
                 </a:solidFill>
@@ -9804,7 +9809,7 @@
               </a:ln>
               <a:extLst>
                 <a:ext uri="{91240B29-F687-4f45-9708-019B960494DF}">
-                  <a14:hiddenLine xmlns:a14="http://schemas.microsoft.com/office/drawing/2010/main" xmlns="" w="9525">
+                  <a14:hiddenLine xmlns="" xmlns:a14="http://schemas.microsoft.com/office/drawing/2010/main" w="9525">
                     <a:solidFill>
                       <a:srgbClr val="000000"/>
                     </a:solidFill>
@@ -9894,7 +9899,7 @@
               </a:ln>
               <a:extLst>
                 <a:ext uri="{91240B29-F687-4f45-9708-019B960494DF}">
-                  <a14:hiddenLine xmlns:a14="http://schemas.microsoft.com/office/drawing/2010/main" xmlns="" w="9525">
+                  <a14:hiddenLine xmlns="" xmlns:a14="http://schemas.microsoft.com/office/drawing/2010/main" w="9525">
                     <a:solidFill>
                       <a:srgbClr val="000000"/>
                     </a:solidFill>
@@ -9984,7 +9989,7 @@
               </a:ln>
               <a:extLst>
                 <a:ext uri="{91240B29-F687-4f45-9708-019B960494DF}">
-                  <a14:hiddenLine xmlns:a14="http://schemas.microsoft.com/office/drawing/2010/main" xmlns="" w="9525">
+                  <a14:hiddenLine xmlns="" xmlns:a14="http://schemas.microsoft.com/office/drawing/2010/main" w="9525">
                     <a:solidFill>
                       <a:srgbClr val="000000"/>
                     </a:solidFill>
@@ -10046,7 +10051,7 @@
               </a:ln>
               <a:extLst>
                 <a:ext uri="{91240B29-F687-4f45-9708-019B960494DF}">
-                  <a14:hiddenLine xmlns:a14="http://schemas.microsoft.com/office/drawing/2010/main" xmlns="" w="9525">
+                  <a14:hiddenLine xmlns="" xmlns:a14="http://schemas.microsoft.com/office/drawing/2010/main" w="9525">
                     <a:solidFill>
                       <a:srgbClr val="000000"/>
                     </a:solidFill>
@@ -10136,7 +10141,7 @@
               </a:ln>
               <a:extLst>
                 <a:ext uri="{91240B29-F687-4f45-9708-019B960494DF}">
-                  <a14:hiddenLine xmlns:a14="http://schemas.microsoft.com/office/drawing/2010/main" xmlns="" w="9525">
+                  <a14:hiddenLine xmlns="" xmlns:a14="http://schemas.microsoft.com/office/drawing/2010/main" w="9525">
                     <a:solidFill>
                       <a:srgbClr val="000000"/>
                     </a:solidFill>
@@ -10198,7 +10203,7 @@
               </a:ln>
               <a:extLst>
                 <a:ext uri="{91240B29-F687-4f45-9708-019B960494DF}">
-                  <a14:hiddenLine xmlns:a14="http://schemas.microsoft.com/office/drawing/2010/main" xmlns="" w="9525">
+                  <a14:hiddenLine xmlns="" xmlns:a14="http://schemas.microsoft.com/office/drawing/2010/main" w="9525">
                     <a:solidFill>
                       <a:srgbClr val="000000"/>
                     </a:solidFill>
@@ -10260,7 +10265,7 @@
               </a:ln>
               <a:extLst>
                 <a:ext uri="{91240B29-F687-4f45-9708-019B960494DF}">
-                  <a14:hiddenLine xmlns:a14="http://schemas.microsoft.com/office/drawing/2010/main" xmlns="" w="9525">
+                  <a14:hiddenLine xmlns="" xmlns:a14="http://schemas.microsoft.com/office/drawing/2010/main" w="9525">
                     <a:solidFill>
                       <a:srgbClr val="000000"/>
                     </a:solidFill>
@@ -10350,7 +10355,7 @@
               </a:ln>
               <a:extLst>
                 <a:ext uri="{91240B29-F687-4f45-9708-019B960494DF}">
-                  <a14:hiddenLine xmlns:a14="http://schemas.microsoft.com/office/drawing/2010/main" xmlns="" w="9525">
+                  <a14:hiddenLine xmlns="" xmlns:a14="http://schemas.microsoft.com/office/drawing/2010/main" w="9525">
                     <a:solidFill>
                       <a:srgbClr val="000000"/>
                     </a:solidFill>
@@ -10440,7 +10445,7 @@
               </a:ln>
               <a:extLst>
                 <a:ext uri="{91240B29-F687-4f45-9708-019B960494DF}">
-                  <a14:hiddenLine xmlns:a14="http://schemas.microsoft.com/office/drawing/2010/main" xmlns="" w="9525">
+                  <a14:hiddenLine xmlns="" xmlns:a14="http://schemas.microsoft.com/office/drawing/2010/main" w="9525">
                     <a:solidFill>
                       <a:srgbClr val="000000"/>
                     </a:solidFill>
@@ -10502,7 +10507,7 @@
               </a:ln>
               <a:extLst>
                 <a:ext uri="{91240B29-F687-4f45-9708-019B960494DF}">
-                  <a14:hiddenLine xmlns:a14="http://schemas.microsoft.com/office/drawing/2010/main" xmlns="" w="9525">
+                  <a14:hiddenLine xmlns="" xmlns:a14="http://schemas.microsoft.com/office/drawing/2010/main" w="9525">
                     <a:solidFill>
                       <a:srgbClr val="000000"/>
                     </a:solidFill>
@@ -10612,7 +10617,7 @@
               </a:ln>
               <a:extLst>
                 <a:ext uri="{91240B29-F687-4f45-9708-019B960494DF}">
-                  <a14:hiddenLine xmlns:a14="http://schemas.microsoft.com/office/drawing/2010/main" xmlns="" w="9525">
+                  <a14:hiddenLine xmlns="" xmlns:a14="http://schemas.microsoft.com/office/drawing/2010/main" w="9525">
                     <a:solidFill>
                       <a:srgbClr val="000000"/>
                     </a:solidFill>
@@ -10696,7 +10701,7 @@
               </a:ln>
               <a:extLst>
                 <a:ext uri="{91240B29-F687-4f45-9708-019B960494DF}">
-                  <a14:hiddenLine xmlns:a14="http://schemas.microsoft.com/office/drawing/2010/main" xmlns="" w="9525">
+                  <a14:hiddenLine xmlns="" xmlns:a14="http://schemas.microsoft.com/office/drawing/2010/main" w="9525">
                     <a:solidFill>
                       <a:srgbClr val="000000"/>
                     </a:solidFill>
@@ -10758,7 +10763,7 @@
               </a:ln>
               <a:extLst>
                 <a:ext uri="{91240B29-F687-4f45-9708-019B960494DF}">
-                  <a14:hiddenLine xmlns:a14="http://schemas.microsoft.com/office/drawing/2010/main" xmlns="" w="9525">
+                  <a14:hiddenLine xmlns="" xmlns:a14="http://schemas.microsoft.com/office/drawing/2010/main" w="9525">
                     <a:solidFill>
                       <a:srgbClr val="000000"/>
                     </a:solidFill>
@@ -10820,7 +10825,7 @@
               </a:ln>
               <a:extLst>
                 <a:ext uri="{91240B29-F687-4f45-9708-019B960494DF}">
-                  <a14:hiddenLine xmlns:a14="http://schemas.microsoft.com/office/drawing/2010/main" xmlns="" w="9525">
+                  <a14:hiddenLine xmlns="" xmlns:a14="http://schemas.microsoft.com/office/drawing/2010/main" w="9525">
                     <a:solidFill>
                       <a:srgbClr val="000000"/>
                     </a:solidFill>
@@ -10910,7 +10915,7 @@
               </a:ln>
               <a:extLst>
                 <a:ext uri="{91240B29-F687-4f45-9708-019B960494DF}">
-                  <a14:hiddenLine xmlns:a14="http://schemas.microsoft.com/office/drawing/2010/main" xmlns="" w="9525">
+                  <a14:hiddenLine xmlns="" xmlns:a14="http://schemas.microsoft.com/office/drawing/2010/main" w="9525">
                     <a:solidFill>
                       <a:srgbClr val="000000"/>
                     </a:solidFill>
@@ -10944,7 +10949,7 @@
               </a:ln>
               <a:extLst>
                 <a:ext uri="{91240B29-F687-4f45-9708-019B960494DF}">
-                  <a14:hiddenLine xmlns:a14="http://schemas.microsoft.com/office/drawing/2010/main" xmlns="" w="9525">
+                  <a14:hiddenLine xmlns="" xmlns:a14="http://schemas.microsoft.com/office/drawing/2010/main" w="9525">
                     <a:solidFill>
                       <a:srgbClr val="000000"/>
                     </a:solidFill>
@@ -11009,7 +11014,7 @@
               </a:ln>
               <a:extLst>
                 <a:ext uri="{91240B29-F687-4f45-9708-019B960494DF}">
-                  <a14:hiddenLine xmlns:a14="http://schemas.microsoft.com/office/drawing/2010/main" xmlns="" w="9525">
+                  <a14:hiddenLine xmlns="" xmlns:a14="http://schemas.microsoft.com/office/drawing/2010/main" w="9525">
                     <a:solidFill>
                       <a:srgbClr val="000000"/>
                     </a:solidFill>
@@ -11099,7 +11104,7 @@
               </a:ln>
               <a:extLst>
                 <a:ext uri="{91240B29-F687-4f45-9708-019B960494DF}">
-                  <a14:hiddenLine xmlns:a14="http://schemas.microsoft.com/office/drawing/2010/main" xmlns="" w="9525">
+                  <a14:hiddenLine xmlns="" xmlns:a14="http://schemas.microsoft.com/office/drawing/2010/main" w="9525">
                     <a:solidFill>
                       <a:srgbClr val="000000"/>
                     </a:solidFill>
@@ -11161,7 +11166,7 @@
               </a:ln>
               <a:extLst>
                 <a:ext uri="{91240B29-F687-4f45-9708-019B960494DF}">
-                  <a14:hiddenLine xmlns:a14="http://schemas.microsoft.com/office/drawing/2010/main" xmlns="" w="9525">
+                  <a14:hiddenLine xmlns="" xmlns:a14="http://schemas.microsoft.com/office/drawing/2010/main" w="9525">
                     <a:solidFill>
                       <a:srgbClr val="000000"/>
                     </a:solidFill>
@@ -11251,7 +11256,7 @@
               </a:ln>
               <a:extLst>
                 <a:ext uri="{91240B29-F687-4f45-9708-019B960494DF}">
-                  <a14:hiddenLine xmlns:a14="http://schemas.microsoft.com/office/drawing/2010/main" xmlns="" w="9525">
+                  <a14:hiddenLine xmlns="" xmlns:a14="http://schemas.microsoft.com/office/drawing/2010/main" w="9525">
                     <a:solidFill>
                       <a:srgbClr val="000000"/>
                     </a:solidFill>
@@ -11316,7 +11321,7 @@
               </a:ln>
               <a:extLst>
                 <a:ext uri="{91240B29-F687-4f45-9708-019B960494DF}">
-                  <a14:hiddenLine xmlns:a14="http://schemas.microsoft.com/office/drawing/2010/main" xmlns="" w="9525">
+                  <a14:hiddenLine xmlns="" xmlns:a14="http://schemas.microsoft.com/office/drawing/2010/main" w="9525">
                     <a:solidFill>
                       <a:srgbClr val="000000"/>
                     </a:solidFill>
@@ -11378,7 +11383,7 @@
               </a:ln>
               <a:extLst>
                 <a:ext uri="{91240B29-F687-4f45-9708-019B960494DF}">
-                  <a14:hiddenLine xmlns:a14="http://schemas.microsoft.com/office/drawing/2010/main" xmlns="" w="9525">
+                  <a14:hiddenLine xmlns="" xmlns:a14="http://schemas.microsoft.com/office/drawing/2010/main" w="9525">
                     <a:solidFill>
                       <a:srgbClr val="000000"/>
                     </a:solidFill>
@@ -11468,7 +11473,7 @@
               </a:ln>
               <a:extLst>
                 <a:ext uri="{91240B29-F687-4f45-9708-019B960494DF}">
-                  <a14:hiddenLine xmlns:a14="http://schemas.microsoft.com/office/drawing/2010/main" xmlns="" w="9525">
+                  <a14:hiddenLine xmlns="" xmlns:a14="http://schemas.microsoft.com/office/drawing/2010/main" w="9525">
                     <a:solidFill>
                       <a:srgbClr val="000000"/>
                     </a:solidFill>
@@ -11558,7 +11563,7 @@
               </a:ln>
               <a:extLst>
                 <a:ext uri="{91240B29-F687-4f45-9708-019B960494DF}">
-                  <a14:hiddenLine xmlns:a14="http://schemas.microsoft.com/office/drawing/2010/main" xmlns="" w="9525">
+                  <a14:hiddenLine xmlns="" xmlns:a14="http://schemas.microsoft.com/office/drawing/2010/main" w="9525">
                     <a:solidFill>
                       <a:srgbClr val="000000"/>
                     </a:solidFill>
@@ -11623,7 +11628,7 @@
               </a:ln>
               <a:extLst>
                 <a:ext uri="{91240B29-F687-4f45-9708-019B960494DF}">
-                  <a14:hiddenLine xmlns:a14="http://schemas.microsoft.com/office/drawing/2010/main" xmlns="" w="9525">
+                  <a14:hiddenLine xmlns="" xmlns:a14="http://schemas.microsoft.com/office/drawing/2010/main" w="9525">
                     <a:solidFill>
                       <a:srgbClr val="000000"/>
                     </a:solidFill>
@@ -11743,7 +11748,7 @@
               </a:ln>
               <a:extLst>
                 <a:ext uri="{91240B29-F687-4f45-9708-019B960494DF}">
-                  <a14:hiddenLine xmlns:a14="http://schemas.microsoft.com/office/drawing/2010/main" xmlns="" w="9525">
+                  <a14:hiddenLine xmlns="" xmlns:a14="http://schemas.microsoft.com/office/drawing/2010/main" w="9525">
                     <a:solidFill>
                       <a:srgbClr val="000000"/>
                     </a:solidFill>
@@ -11841,7 +11846,7 @@
               </a:ln>
               <a:extLst>
                 <a:ext uri="{91240B29-F687-4f45-9708-019B960494DF}">
-                  <a14:hiddenLine xmlns:a14="http://schemas.microsoft.com/office/drawing/2010/main" xmlns="" w="9525">
+                  <a14:hiddenLine xmlns="" xmlns:a14="http://schemas.microsoft.com/office/drawing/2010/main" w="9525">
                     <a:solidFill>
                       <a:srgbClr val="000000"/>
                     </a:solidFill>
@@ -11956,7 +11961,7 @@
               </a:ln>
               <a:extLst>
                 <a:ext uri="{91240B29-F687-4f45-9708-019B960494DF}">
-                  <a14:hiddenLine xmlns:a14="http://schemas.microsoft.com/office/drawing/2010/main" xmlns="" w="9525">
+                  <a14:hiddenLine xmlns="" xmlns:a14="http://schemas.microsoft.com/office/drawing/2010/main" w="9525">
                     <a:solidFill>
                       <a:srgbClr val="000000"/>
                     </a:solidFill>
@@ -12046,7 +12051,7 @@
               </a:ln>
               <a:extLst>
                 <a:ext uri="{91240B29-F687-4f45-9708-019B960494DF}">
-                  <a14:hiddenLine xmlns:a14="http://schemas.microsoft.com/office/drawing/2010/main" xmlns="" w="9525">
+                  <a14:hiddenLine xmlns="" xmlns:a14="http://schemas.microsoft.com/office/drawing/2010/main" w="9525">
                     <a:solidFill>
                       <a:srgbClr val="000000"/>
                     </a:solidFill>
@@ -12111,7 +12116,7 @@
               </a:ln>
               <a:extLst>
                 <a:ext uri="{91240B29-F687-4f45-9708-019B960494DF}">
-                  <a14:hiddenLine xmlns:a14="http://schemas.microsoft.com/office/drawing/2010/main" xmlns="" w="9525">
+                  <a14:hiddenLine xmlns="" xmlns:a14="http://schemas.microsoft.com/office/drawing/2010/main" w="9525">
                     <a:solidFill>
                       <a:srgbClr val="000000"/>
                     </a:solidFill>
@@ -12201,7 +12206,7 @@
               </a:ln>
               <a:extLst>
                 <a:ext uri="{91240B29-F687-4f45-9708-019B960494DF}">
-                  <a14:hiddenLine xmlns:a14="http://schemas.microsoft.com/office/drawing/2010/main" xmlns="" w="9525">
+                  <a14:hiddenLine xmlns="" xmlns:a14="http://schemas.microsoft.com/office/drawing/2010/main" w="9525">
                     <a:solidFill>
                       <a:srgbClr val="000000"/>
                     </a:solidFill>
@@ -12269,7 +12274,7 @@
               </a:ln>
               <a:extLst>
                 <a:ext uri="{91240B29-F687-4f45-9708-019B960494DF}">
-                  <a14:hiddenLine xmlns:a14="http://schemas.microsoft.com/office/drawing/2010/main" xmlns="" w="9525">
+                  <a14:hiddenLine xmlns="" xmlns:a14="http://schemas.microsoft.com/office/drawing/2010/main" w="9525">
                     <a:solidFill>
                       <a:srgbClr val="000000"/>
                     </a:solidFill>
@@ -12359,7 +12364,7 @@
               </a:ln>
               <a:extLst>
                 <a:ext uri="{91240B29-F687-4f45-9708-019B960494DF}">
-                  <a14:hiddenLine xmlns:a14="http://schemas.microsoft.com/office/drawing/2010/main" xmlns="" w="9525">
+                  <a14:hiddenLine xmlns="" xmlns:a14="http://schemas.microsoft.com/office/drawing/2010/main" w="9525">
                     <a:solidFill>
                       <a:srgbClr val="000000"/>
                     </a:solidFill>
@@ -12427,7 +12432,7 @@
               </a:ln>
               <a:extLst>
                 <a:ext uri="{91240B29-F687-4f45-9708-019B960494DF}">
-                  <a14:hiddenLine xmlns:a14="http://schemas.microsoft.com/office/drawing/2010/main" xmlns="" w="9525">
+                  <a14:hiddenLine xmlns="" xmlns:a14="http://schemas.microsoft.com/office/drawing/2010/main" w="9525">
                     <a:solidFill>
                       <a:srgbClr val="000000"/>
                     </a:solidFill>
@@ -12517,7 +12522,7 @@
               </a:ln>
               <a:extLst>
                 <a:ext uri="{91240B29-F687-4f45-9708-019B960494DF}">
-                  <a14:hiddenLine xmlns:a14="http://schemas.microsoft.com/office/drawing/2010/main" xmlns="" w="9525">
+                  <a14:hiddenLine xmlns="" xmlns:a14="http://schemas.microsoft.com/office/drawing/2010/main" w="9525">
                     <a:solidFill>
                       <a:srgbClr val="000000"/>
                     </a:solidFill>
@@ -12551,7 +12556,7 @@
               </a:ln>
               <a:extLst>
                 <a:ext uri="{91240B29-F687-4f45-9708-019B960494DF}">
-                  <a14:hiddenLine xmlns:a14="http://schemas.microsoft.com/office/drawing/2010/main" xmlns="" w="9525">
+                  <a14:hiddenLine xmlns="" xmlns:a14="http://schemas.microsoft.com/office/drawing/2010/main" w="9525">
                     <a:solidFill>
                       <a:srgbClr val="000000"/>
                     </a:solidFill>
@@ -13239,13 +13244,13 @@
   <p:clrMapOvr>
     <a:masterClrMapping/>
   </p:clrMapOvr>
-  <mc:AlternateContent xmlns:mc="http://schemas.openxmlformats.org/markup-compatibility/2006">
-    <mc:Choice xmlns:p15="http://schemas.microsoft.com/office/powerpoint/2012/main" Requires="p15">
+  <mc:AlternateContent xmlns:mc="http://schemas.openxmlformats.org/markup-compatibility/2006" xmlns:p15="http://schemas.microsoft.com/office/powerpoint/2012/main">
+    <mc:Choice Requires="p15">
       <p:transition spd="slow">
         <p15:prstTrans prst="peelOff"/>
       </p:transition>
     </mc:Choice>
-    <mc:Fallback>
+    <mc:Fallback xmlns="">
       <p:transition spd="slow">
         <p:fade/>
       </p:transition>
@@ -13328,7 +13333,7 @@
         </p:spPr>
         <p:txBody>
           <a:bodyPr>
-            <a:normAutofit lnSpcReduction="10000"/>
+            <a:normAutofit fontScale="92500"/>
           </a:bodyPr>
           <a:lstStyle/>
           <a:p>
@@ -13352,7 +13357,7 @@
           <a:p>
             <a:r>
               <a:rPr lang="en-GB" dirty="0"/>
-              <a:t>We’ll be covering how documentation management were used to support the management of the software development exercise.</a:t>
+              <a:t>We’ll be covering how documentation management and version control were used to support the management of the software development exercise.</a:t>
             </a:r>
           </a:p>
           <a:p>
@@ -13373,13 +13378,13 @@
   <p:clrMapOvr>
     <a:masterClrMapping/>
   </p:clrMapOvr>
-  <mc:AlternateContent xmlns:mc="http://schemas.openxmlformats.org/markup-compatibility/2006">
-    <mc:Choice xmlns:p15="http://schemas.microsoft.com/office/powerpoint/2012/main" Requires="p15">
+  <mc:AlternateContent xmlns:mc="http://schemas.openxmlformats.org/markup-compatibility/2006" xmlns:p15="http://schemas.microsoft.com/office/powerpoint/2012/main">
+    <mc:Choice Requires="p15">
       <p:transition spd="slow">
         <p15:prstTrans prst="peelOff" invX="1"/>
       </p:transition>
     </mc:Choice>
-    <mc:Fallback>
+    <mc:Fallback xmlns="">
       <p:transition spd="slow">
         <p:fade/>
       </p:transition>
@@ -13820,7 +13825,7 @@
           <a:p>
             <a:r>
               <a:rPr lang="en-US" dirty="0"/>
-              <a:t>Google Drive was used to securely store the files and had the team access them anytime.</a:t>
+              <a:t>Google Drive was used to securely store the files and it allowed the team to access them anytime.</a:t>
             </a:r>
           </a:p>
           <a:p>
@@ -13829,7 +13834,7 @@
           <a:p>
             <a:r>
               <a:rPr lang="en-US" dirty="0"/>
-              <a:t>It allowed the team to freely make any changes and work on a change spontaneously.</a:t>
+              <a:t>It allowed the team to make any changes to the files freely or work together to make spontaneous changes.</a:t>
             </a:r>
           </a:p>
           <a:p>
@@ -13892,13 +13897,13 @@
   <p:clrMapOvr>
     <a:masterClrMapping/>
   </p:clrMapOvr>
-  <mc:AlternateContent xmlns:mc="http://schemas.openxmlformats.org/markup-compatibility/2006">
-    <mc:Choice xmlns:p15="http://schemas.microsoft.com/office/powerpoint/2012/main" Requires="p15">
+  <mc:AlternateContent xmlns:mc="http://schemas.openxmlformats.org/markup-compatibility/2006" xmlns:p15="http://schemas.microsoft.com/office/powerpoint/2012/main">
+    <mc:Choice Requires="p15">
       <p:transition spd="slow">
         <p15:prstTrans prst="peelOff"/>
       </p:transition>
     </mc:Choice>
-    <mc:Fallback>
+    <mc:Fallback xmlns="">
       <p:transition spd="slow">
         <p:fade/>
       </p:transition>
@@ -14020,41 +14025,6 @@
                                   </p:childTnLst>
                                 </p:cTn>
                               </p:par>
-                              <p:par>
-                                <p:cTn id="13" presetID="16" presetClass="entr" presetSubtype="37" fill="hold" nodeType="withEffect">
-                                  <p:stCondLst>
-                                    <p:cond delay="0"/>
-                                  </p:stCondLst>
-                                  <p:childTnLst>
-                                    <p:set>
-                                      <p:cBhvr>
-                                        <p:cTn id="14" dur="1" fill="hold">
-                                          <p:stCondLst>
-                                            <p:cond delay="0"/>
-                                          </p:stCondLst>
-                                        </p:cTn>
-                                        <p:tgtEl>
-                                          <p:spTgt spid="8"/>
-                                        </p:tgtEl>
-                                        <p:attrNameLst>
-                                          <p:attrName>style.visibility</p:attrName>
-                                        </p:attrNameLst>
-                                      </p:cBhvr>
-                                      <p:to>
-                                        <p:strVal val="visible"/>
-                                      </p:to>
-                                    </p:set>
-                                    <p:animEffect transition="in" filter="barn(outVertical)">
-                                      <p:cBhvr>
-                                        <p:cTn id="15" dur="500"/>
-                                        <p:tgtEl>
-                                          <p:spTgt spid="8"/>
-                                        </p:tgtEl>
-                                      </p:cBhvr>
-                                    </p:animEffect>
-                                  </p:childTnLst>
-                                </p:cTn>
-                              </p:par>
                             </p:childTnLst>
                           </p:cTn>
                         </p:par>
@@ -14062,26 +14032,26 @@
                     </p:cTn>
                   </p:par>
                   <p:par>
-                    <p:cTn id="16" fill="hold">
+                    <p:cTn id="13" fill="hold">
                       <p:stCondLst>
                         <p:cond delay="indefinite"/>
                       </p:stCondLst>
                       <p:childTnLst>
                         <p:par>
-                          <p:cTn id="17" fill="hold">
+                          <p:cTn id="14" fill="hold">
                             <p:stCondLst>
                               <p:cond delay="0"/>
                             </p:stCondLst>
                             <p:childTnLst>
                               <p:par>
-                                <p:cTn id="18" presetID="16" presetClass="entr" presetSubtype="37" fill="hold" nodeType="clickEffect">
+                                <p:cTn id="15" presetID="16" presetClass="entr" presetSubtype="37" fill="hold" nodeType="clickEffect">
                                   <p:stCondLst>
                                     <p:cond delay="0"/>
                                   </p:stCondLst>
                                   <p:childTnLst>
                                     <p:set>
                                       <p:cBhvr>
-                                        <p:cTn id="19" dur="1" fill="hold">
+                                        <p:cTn id="16" dur="1" fill="hold">
                                           <p:stCondLst>
                                             <p:cond delay="0"/>
                                           </p:stCondLst>
@@ -14103,13 +14073,48 @@
                                     </p:set>
                                     <p:animEffect transition="in" filter="barn(outVertical)">
                                       <p:cBhvr>
-                                        <p:cTn id="20" dur="500"/>
+                                        <p:cTn id="17" dur="500"/>
                                         <p:tgtEl>
                                           <p:spTgt spid="10">
                                             <p:txEl>
                                               <p:pRg st="2" end="2"/>
                                             </p:txEl>
                                           </p:spTgt>
+                                        </p:tgtEl>
+                                      </p:cBhvr>
+                                    </p:animEffect>
+                                  </p:childTnLst>
+                                </p:cTn>
+                              </p:par>
+                              <p:par>
+                                <p:cTn id="18" presetID="16" presetClass="entr" presetSubtype="37" fill="hold" nodeType="withEffect">
+                                  <p:stCondLst>
+                                    <p:cond delay="0"/>
+                                  </p:stCondLst>
+                                  <p:childTnLst>
+                                    <p:set>
+                                      <p:cBhvr>
+                                        <p:cTn id="19" dur="1" fill="hold">
+                                          <p:stCondLst>
+                                            <p:cond delay="0"/>
+                                          </p:stCondLst>
+                                        </p:cTn>
+                                        <p:tgtEl>
+                                          <p:spTgt spid="8"/>
+                                        </p:tgtEl>
+                                        <p:attrNameLst>
+                                          <p:attrName>style.visibility</p:attrName>
+                                        </p:attrNameLst>
+                                      </p:cBhvr>
+                                      <p:to>
+                                        <p:strVal val="visible"/>
+                                      </p:to>
+                                    </p:set>
+                                    <p:animEffect transition="in" filter="barn(outVertical)">
+                                      <p:cBhvr>
+                                        <p:cTn id="20" dur="500"/>
+                                        <p:tgtEl>
+                                          <p:spTgt spid="8"/>
                                         </p:tgtEl>
                                       </p:cBhvr>
                                     </p:animEffect>
@@ -14491,13 +14496,13 @@
   <p:clrMapOvr>
     <a:masterClrMapping/>
   </p:clrMapOvr>
-  <mc:AlternateContent xmlns:mc="http://schemas.openxmlformats.org/markup-compatibility/2006">
-    <mc:Choice xmlns:p15="http://schemas.microsoft.com/office/powerpoint/2012/main" Requires="p15">
+  <mc:AlternateContent xmlns:mc="http://schemas.openxmlformats.org/markup-compatibility/2006" xmlns:p15="http://schemas.microsoft.com/office/powerpoint/2012/main">
+    <mc:Choice Requires="p15">
       <p:transition spd="slow">
         <p15:prstTrans prst="peelOff" invX="1"/>
       </p:transition>
     </mc:Choice>
-    <mc:Fallback>
+    <mc:Fallback xmlns="">
       <p:transition spd="slow">
         <p:fade/>
       </p:transition>
@@ -15012,13 +15017,13 @@
   <p:clrMapOvr>
     <a:masterClrMapping/>
   </p:clrMapOvr>
-  <mc:AlternateContent xmlns:mc="http://schemas.openxmlformats.org/markup-compatibility/2006">
-    <mc:Choice xmlns:p15="http://schemas.microsoft.com/office/powerpoint/2012/main" Requires="p15">
+  <mc:AlternateContent xmlns:mc="http://schemas.openxmlformats.org/markup-compatibility/2006" xmlns:p15="http://schemas.microsoft.com/office/powerpoint/2012/main">
+    <mc:Choice Requires="p15">
       <p:transition spd="slow">
         <p15:prstTrans prst="peelOff"/>
       </p:transition>
     </mc:Choice>
-    <mc:Fallback>
+    <mc:Fallback xmlns="">
       <p:transition spd="slow">
         <p:fade/>
       </p:transition>
@@ -15405,13 +15410,13 @@
   <p:clrMapOvr>
     <a:masterClrMapping/>
   </p:clrMapOvr>
-  <mc:AlternateContent xmlns:mc="http://schemas.openxmlformats.org/markup-compatibility/2006">
-    <mc:Choice xmlns:p15="http://schemas.microsoft.com/office/powerpoint/2012/main" Requires="p15">
+  <mc:AlternateContent xmlns:mc="http://schemas.openxmlformats.org/markup-compatibility/2006" xmlns:p15="http://schemas.microsoft.com/office/powerpoint/2012/main">
+    <mc:Choice Requires="p15">
       <p:transition spd="slow">
         <p15:prstTrans prst="peelOff" invX="1"/>
       </p:transition>
     </mc:Choice>
-    <mc:Fallback>
+    <mc:Fallback xmlns="">
       <p:transition spd="slow">
         <p:fade/>
       </p:transition>

</xml_diff>